<commit_message>
'button_ctrl' has been updated for PLL control.
</commit_message>
<xml_diff>
--- a/0090_ber/rtl/schematic/lvds_test.pptx
+++ b/0090_ber/rtl/schematic/lvds_test.pptx
@@ -197,7 +197,7 @@
           <a:p>
             <a:fld id="{B9E5BF02-4A65-43B2-AA51-912306618617}" type="datetimeFigureOut">
               <a:rPr lang="en-US" smtClean="0"/>
-              <a:t>10/24/2017</a:t>
+              <a:t>10/25/2017</a:t>
             </a:fld>
             <a:endParaRPr lang="en-US"/>
           </a:p>
@@ -685,7 +685,7 @@
           <a:p>
             <a:fld id="{F8F920B2-3E99-4C9D-9450-62A3DEC5476B}" type="datetimeFigureOut">
               <a:rPr lang="en-US" smtClean="0"/>
-              <a:t>10/24/2017</a:t>
+              <a:t>10/25/2017</a:t>
             </a:fld>
             <a:endParaRPr lang="en-US"/>
           </a:p>
@@ -855,7 +855,7 @@
           <a:p>
             <a:fld id="{F8F920B2-3E99-4C9D-9450-62A3DEC5476B}" type="datetimeFigureOut">
               <a:rPr lang="en-US" smtClean="0"/>
-              <a:t>10/24/2017</a:t>
+              <a:t>10/25/2017</a:t>
             </a:fld>
             <a:endParaRPr lang="en-US"/>
           </a:p>
@@ -1035,7 +1035,7 @@
           <a:p>
             <a:fld id="{F8F920B2-3E99-4C9D-9450-62A3DEC5476B}" type="datetimeFigureOut">
               <a:rPr lang="en-US" smtClean="0"/>
-              <a:t>10/24/2017</a:t>
+              <a:t>10/25/2017</a:t>
             </a:fld>
             <a:endParaRPr lang="en-US"/>
           </a:p>
@@ -1205,7 +1205,7 @@
           <a:p>
             <a:fld id="{F8F920B2-3E99-4C9D-9450-62A3DEC5476B}" type="datetimeFigureOut">
               <a:rPr lang="en-US" smtClean="0"/>
-              <a:t>10/24/2017</a:t>
+              <a:t>10/25/2017</a:t>
             </a:fld>
             <a:endParaRPr lang="en-US"/>
           </a:p>
@@ -1449,7 +1449,7 @@
           <a:p>
             <a:fld id="{F8F920B2-3E99-4C9D-9450-62A3DEC5476B}" type="datetimeFigureOut">
               <a:rPr lang="en-US" smtClean="0"/>
-              <a:t>10/24/2017</a:t>
+              <a:t>10/25/2017</a:t>
             </a:fld>
             <a:endParaRPr lang="en-US"/>
           </a:p>
@@ -1681,7 +1681,7 @@
           <a:p>
             <a:fld id="{F8F920B2-3E99-4C9D-9450-62A3DEC5476B}" type="datetimeFigureOut">
               <a:rPr lang="en-US" smtClean="0"/>
-              <a:t>10/24/2017</a:t>
+              <a:t>10/25/2017</a:t>
             </a:fld>
             <a:endParaRPr lang="en-US"/>
           </a:p>
@@ -2048,7 +2048,7 @@
           <a:p>
             <a:fld id="{F8F920B2-3E99-4C9D-9450-62A3DEC5476B}" type="datetimeFigureOut">
               <a:rPr lang="en-US" smtClean="0"/>
-              <a:t>10/24/2017</a:t>
+              <a:t>10/25/2017</a:t>
             </a:fld>
             <a:endParaRPr lang="en-US"/>
           </a:p>
@@ -2166,7 +2166,7 @@
           <a:p>
             <a:fld id="{F8F920B2-3E99-4C9D-9450-62A3DEC5476B}" type="datetimeFigureOut">
               <a:rPr lang="en-US" smtClean="0"/>
-              <a:t>10/24/2017</a:t>
+              <a:t>10/25/2017</a:t>
             </a:fld>
             <a:endParaRPr lang="en-US"/>
           </a:p>
@@ -2261,7 +2261,7 @@
           <a:p>
             <a:fld id="{F8F920B2-3E99-4C9D-9450-62A3DEC5476B}" type="datetimeFigureOut">
               <a:rPr lang="en-US" smtClean="0"/>
-              <a:t>10/24/2017</a:t>
+              <a:t>10/25/2017</a:t>
             </a:fld>
             <a:endParaRPr lang="en-US"/>
           </a:p>
@@ -2538,7 +2538,7 @@
           <a:p>
             <a:fld id="{F8F920B2-3E99-4C9D-9450-62A3DEC5476B}" type="datetimeFigureOut">
               <a:rPr lang="en-US" smtClean="0"/>
-              <a:t>10/24/2017</a:t>
+              <a:t>10/25/2017</a:t>
             </a:fld>
             <a:endParaRPr lang="en-US"/>
           </a:p>
@@ -2795,7 +2795,7 @@
           <a:p>
             <a:fld id="{F8F920B2-3E99-4C9D-9450-62A3DEC5476B}" type="datetimeFigureOut">
               <a:rPr lang="en-US" smtClean="0"/>
-              <a:t>10/24/2017</a:t>
+              <a:t>10/25/2017</a:t>
             </a:fld>
             <a:endParaRPr lang="en-US"/>
           </a:p>
@@ -3008,7 +3008,7 @@
           <a:p>
             <a:fld id="{F8F920B2-3E99-4C9D-9450-62A3DEC5476B}" type="datetimeFigureOut">
               <a:rPr lang="en-US" smtClean="0"/>
-              <a:t>10/24/2017</a:t>
+              <a:t>10/25/2017</a:t>
             </a:fld>
             <a:endParaRPr lang="en-US"/>
           </a:p>
@@ -7799,15 +7799,22 @@
           <a:lstStyle/>
           <a:p>
             <a:r>
-              <a:rPr lang="en-US" sz="900" dirty="0">
-                <a:solidFill>
-                  <a:srgbClr val="000000"/>
-                </a:solidFill>
-                <a:latin typeface="Courier New" panose="02070309020205020404" pitchFamily="49" charset="0"/>
-                <a:cs typeface="Courier New" panose="02070309020205020404" pitchFamily="49" charset="0"/>
-              </a:rPr>
-              <a:t>CNT2</a:t>
-            </a:r>
+              <a:rPr lang="en-US" sz="900" dirty="0" smtClean="0">
+                <a:solidFill>
+                  <a:srgbClr val="000000"/>
+                </a:solidFill>
+                <a:latin typeface="Courier New" panose="02070309020205020404" pitchFamily="49" charset="0"/>
+                <a:cs typeface="Courier New" panose="02070309020205020404" pitchFamily="49" charset="0"/>
+              </a:rPr>
+              <a:t>PLL_ADDR</a:t>
+            </a:r>
+            <a:endParaRPr lang="en-US" sz="900" dirty="0">
+              <a:solidFill>
+                <a:srgbClr val="000000"/>
+              </a:solidFill>
+              <a:latin typeface="Courier New" panose="02070309020205020404" pitchFamily="49" charset="0"/>
+              <a:cs typeface="Courier New" panose="02070309020205020404" pitchFamily="49" charset="0"/>
+            </a:endParaRPr>
           </a:p>
         </p:txBody>
       </p:sp>
@@ -8551,128 +8558,17 @@
       </p:sp>
       <p:cxnSp>
         <p:nvCxnSpPr>
-          <p:cNvPr id="273" name="Straight Connector 272"/>
-          <p:cNvCxnSpPr/>
-          <p:nvPr/>
-        </p:nvCxnSpPr>
-        <p:spPr>
-          <a:xfrm flipV="1">
-            <a:off x="5638800" y="5181600"/>
-            <a:ext cx="0" cy="304800"/>
-          </a:xfrm>
-          <a:prstGeom prst="line">
-            <a:avLst/>
-          </a:prstGeom>
-          <a:ln w="12700">
-            <a:solidFill>
-              <a:srgbClr val="000000"/>
-            </a:solidFill>
-            <a:headEnd type="oval" w="med" len="med"/>
-            <a:tailEnd type="none" w="med" len="med"/>
-          </a:ln>
-        </p:spPr>
-        <p:style>
-          <a:lnRef idx="1">
-            <a:schemeClr val="accent1"/>
-          </a:lnRef>
-          <a:fillRef idx="0">
-            <a:schemeClr val="accent1"/>
-          </a:fillRef>
-          <a:effectRef idx="0">
-            <a:schemeClr val="accent1"/>
-          </a:effectRef>
-          <a:fontRef idx="minor">
-            <a:schemeClr val="tx1"/>
-          </a:fontRef>
-        </p:style>
-      </p:cxnSp>
-      <p:cxnSp>
-        <p:nvCxnSpPr>
-          <p:cNvPr id="275" name="Straight Connector 274"/>
-          <p:cNvCxnSpPr/>
-          <p:nvPr/>
-        </p:nvCxnSpPr>
-        <p:spPr>
-          <a:xfrm>
-            <a:off x="5638800" y="5181600"/>
-            <a:ext cx="304800" cy="0"/>
-          </a:xfrm>
-          <a:prstGeom prst="line">
-            <a:avLst/>
-          </a:prstGeom>
-          <a:ln w="12700">
-            <a:solidFill>
-              <a:srgbClr val="000000"/>
-            </a:solidFill>
-            <a:headEnd type="none" w="med" len="med"/>
-            <a:tailEnd type="triangle" w="med" len="med"/>
-          </a:ln>
-        </p:spPr>
-        <p:style>
-          <a:lnRef idx="1">
-            <a:schemeClr val="accent1"/>
-          </a:lnRef>
-          <a:fillRef idx="0">
-            <a:schemeClr val="accent1"/>
-          </a:fillRef>
-          <a:effectRef idx="0">
-            <a:schemeClr val="accent1"/>
-          </a:effectRef>
-          <a:fontRef idx="minor">
-            <a:schemeClr val="tx1"/>
-          </a:fontRef>
-        </p:style>
-      </p:cxnSp>
-      <p:cxnSp>
-        <p:nvCxnSpPr>
-          <p:cNvPr id="277" name="Straight Connector 276"/>
-          <p:cNvCxnSpPr/>
-          <p:nvPr/>
-        </p:nvCxnSpPr>
-        <p:spPr>
-          <a:xfrm flipH="1">
-            <a:off x="5943600" y="5181600"/>
-            <a:ext cx="1981200" cy="0"/>
-          </a:xfrm>
-          <a:prstGeom prst="line">
-            <a:avLst/>
-          </a:prstGeom>
-          <a:ln w="12700">
-            <a:solidFill>
-              <a:srgbClr val="000000"/>
-            </a:solidFill>
-            <a:prstDash val="dash"/>
-            <a:headEnd type="none" w="med" len="med"/>
-            <a:tailEnd type="none" w="med" len="med"/>
-          </a:ln>
-        </p:spPr>
-        <p:style>
-          <a:lnRef idx="1">
-            <a:schemeClr val="accent1"/>
-          </a:lnRef>
-          <a:fillRef idx="0">
-            <a:schemeClr val="accent1"/>
-          </a:fillRef>
-          <a:effectRef idx="0">
-            <a:schemeClr val="accent1"/>
-          </a:effectRef>
-          <a:fontRef idx="minor">
-            <a:schemeClr val="tx1"/>
-          </a:fontRef>
-        </p:style>
-      </p:cxnSp>
-      <p:cxnSp>
-        <p:nvCxnSpPr>
           <p:cNvPr id="282" name="Straight Connector 281"/>
           <p:cNvCxnSpPr>
+            <a:stCxn id="226" idx="3"/>
             <a:endCxn id="272" idx="1"/>
           </p:cNvCxnSpPr>
           <p:nvPr/>
         </p:nvCxnSpPr>
         <p:spPr>
           <a:xfrm>
-            <a:off x="7924800" y="5181600"/>
-            <a:ext cx="3352800" cy="0"/>
+            <a:off x="7620000" y="5181600"/>
+            <a:ext cx="3657600" cy="0"/>
           </a:xfrm>
           <a:prstGeom prst="line">
             <a:avLst/>
@@ -10184,14 +10080,24 @@
           <a:lstStyle/>
           <a:p>
             <a:r>
-              <a:rPr lang="en-US" sz="900" dirty="0" err="1">
-                <a:solidFill>
-                  <a:srgbClr val="000000"/>
-                </a:solidFill>
-                <a:latin typeface="Courier New" panose="02070309020205020404" pitchFamily="49" charset="0"/>
-                <a:cs typeface="Courier New" panose="02070309020205020404" pitchFamily="49" charset="0"/>
-              </a:rPr>
-              <a:t>main_mode</a:t>
+              <a:rPr lang="en-US" sz="900" dirty="0" err="1" smtClean="0">
+                <a:solidFill>
+                  <a:srgbClr val="000000"/>
+                </a:solidFill>
+                <a:latin typeface="Courier New" panose="02070309020205020404" pitchFamily="49" charset="0"/>
+                <a:cs typeface="Courier New" panose="02070309020205020404" pitchFamily="49" charset="0"/>
+              </a:rPr>
+              <a:t>sub</a:t>
+            </a:r>
+            <a:r>
+              <a:rPr lang="en-US" sz="900" dirty="0" err="1" smtClean="0">
+                <a:solidFill>
+                  <a:srgbClr val="000000"/>
+                </a:solidFill>
+                <a:latin typeface="Courier New" panose="02070309020205020404" pitchFamily="49" charset="0"/>
+                <a:cs typeface="Courier New" panose="02070309020205020404" pitchFamily="49" charset="0"/>
+              </a:rPr>
+              <a:t>_mode</a:t>
             </a:r>
             <a:endParaRPr lang="en-US" sz="900" dirty="0">
               <a:solidFill>
@@ -11310,17 +11216,7 @@
                 <a:latin typeface="Courier New" panose="02070309020205020404" pitchFamily="49" charset="0"/>
                 <a:cs typeface="Courier New" panose="02070309020205020404" pitchFamily="49" charset="0"/>
               </a:rPr>
-              <a:t>*_</a:t>
-            </a:r>
-            <a:r>
-              <a:rPr lang="en-US" sz="900" dirty="0" smtClean="0">
-                <a:solidFill>
-                  <a:srgbClr val="000000"/>
-                </a:solidFill>
-                <a:latin typeface="Courier New" panose="02070309020205020404" pitchFamily="49" charset="0"/>
-                <a:cs typeface="Courier New" panose="02070309020205020404" pitchFamily="49" charset="0"/>
-              </a:rPr>
-              <a:t>SR_B</a:t>
+              <a:t>*_SR_B</a:t>
             </a:r>
             <a:endParaRPr lang="en-US" sz="900" dirty="0">
               <a:solidFill>
@@ -11418,17 +11314,7 @@
                 <a:latin typeface="Courier New" panose="02070309020205020404" pitchFamily="49" charset="0"/>
                 <a:cs typeface="Courier New" panose="02070309020205020404" pitchFamily="49" charset="0"/>
               </a:rPr>
-              <a:t>*_</a:t>
-            </a:r>
-            <a:r>
-              <a:rPr lang="en-US" sz="900" dirty="0" smtClean="0">
-                <a:solidFill>
-                  <a:srgbClr val="000000"/>
-                </a:solidFill>
-                <a:latin typeface="Courier New" panose="02070309020205020404" pitchFamily="49" charset="0"/>
-                <a:cs typeface="Courier New" panose="02070309020205020404" pitchFamily="49" charset="0"/>
-              </a:rPr>
-              <a:t>PUDEN_TX_B</a:t>
+              <a:t>*_PUDEN_TX_B</a:t>
             </a:r>
             <a:endParaRPr lang="en-US" sz="900" dirty="0">
               <a:solidFill>
@@ -11526,17 +11412,7 @@
                 <a:latin typeface="Courier New" panose="02070309020205020404" pitchFamily="49" charset="0"/>
                 <a:cs typeface="Courier New" panose="02070309020205020404" pitchFamily="49" charset="0"/>
               </a:rPr>
-              <a:t>*_</a:t>
-            </a:r>
-            <a:r>
-              <a:rPr lang="en-US" sz="900" dirty="0" smtClean="0">
-                <a:solidFill>
-                  <a:srgbClr val="000000"/>
-                </a:solidFill>
-                <a:latin typeface="Courier New" panose="02070309020205020404" pitchFamily="49" charset="0"/>
-                <a:cs typeface="Courier New" panose="02070309020205020404" pitchFamily="49" charset="0"/>
-              </a:rPr>
-              <a:t>PUDEN_RX_B</a:t>
+              <a:t>*_PUDEN_RX_B</a:t>
             </a:r>
             <a:endParaRPr lang="en-US" sz="900" dirty="0">
               <a:solidFill>
@@ -11585,17 +11461,7 @@
                 <a:latin typeface="Courier New" panose="02070309020205020404" pitchFamily="49" charset="0"/>
                 <a:cs typeface="Courier New" panose="02070309020205020404" pitchFamily="49" charset="0"/>
               </a:rPr>
-              <a:t>*_</a:t>
-            </a:r>
-            <a:r>
-              <a:rPr lang="en-US" sz="900" dirty="0" smtClean="0">
-                <a:solidFill>
-                  <a:srgbClr val="000000"/>
-                </a:solidFill>
-                <a:latin typeface="Courier New" panose="02070309020205020404" pitchFamily="49" charset="0"/>
-                <a:cs typeface="Courier New" panose="02070309020205020404" pitchFamily="49" charset="0"/>
-              </a:rPr>
-              <a:t>PUDPOL_TX_A</a:t>
+              <a:t>*_PUDPOL_TX_A</a:t>
             </a:r>
             <a:endParaRPr lang="en-US" sz="900" dirty="0">
               <a:solidFill>
@@ -11644,17 +11510,7 @@
                 <a:latin typeface="Courier New" panose="02070309020205020404" pitchFamily="49" charset="0"/>
                 <a:cs typeface="Courier New" panose="02070309020205020404" pitchFamily="49" charset="0"/>
               </a:rPr>
-              <a:t>*_</a:t>
-            </a:r>
-            <a:r>
-              <a:rPr lang="en-US" sz="900" dirty="0" smtClean="0">
-                <a:solidFill>
-                  <a:srgbClr val="000000"/>
-                </a:solidFill>
-                <a:latin typeface="Courier New" panose="02070309020205020404" pitchFamily="49" charset="0"/>
-                <a:cs typeface="Courier New" panose="02070309020205020404" pitchFamily="49" charset="0"/>
-              </a:rPr>
-              <a:t>PUDPOL_TX_B</a:t>
+              <a:t>*_PUDPOL_TX_B</a:t>
             </a:r>
             <a:endParaRPr lang="en-US" sz="900" dirty="0">
               <a:solidFill>
@@ -11703,17 +11559,7 @@
                 <a:latin typeface="Courier New" panose="02070309020205020404" pitchFamily="49" charset="0"/>
                 <a:cs typeface="Courier New" panose="02070309020205020404" pitchFamily="49" charset="0"/>
               </a:rPr>
-              <a:t>*_</a:t>
-            </a:r>
-            <a:r>
-              <a:rPr lang="en-US" sz="900" dirty="0" smtClean="0">
-                <a:solidFill>
-                  <a:srgbClr val="000000"/>
-                </a:solidFill>
-                <a:latin typeface="Courier New" panose="02070309020205020404" pitchFamily="49" charset="0"/>
-                <a:cs typeface="Courier New" panose="02070309020205020404" pitchFamily="49" charset="0"/>
-              </a:rPr>
-              <a:t>PUDPOL_RX_A</a:t>
+              <a:t>*_PUDPOL_RX_A</a:t>
             </a:r>
             <a:endParaRPr lang="en-US" sz="900" dirty="0">
               <a:solidFill>
@@ -11831,17 +11677,7 @@
                 <a:latin typeface="Courier New" panose="02070309020205020404" pitchFamily="49" charset="0"/>
                 <a:cs typeface="Courier New" panose="02070309020205020404" pitchFamily="49" charset="0"/>
               </a:rPr>
-              <a:t>*_</a:t>
-            </a:r>
-            <a:r>
-              <a:rPr lang="en-US" sz="900" dirty="0" smtClean="0">
-                <a:solidFill>
-                  <a:srgbClr val="000000"/>
-                </a:solidFill>
-                <a:latin typeface="Courier New" panose="02070309020205020404" pitchFamily="49" charset="0"/>
-                <a:cs typeface="Courier New" panose="02070309020205020404" pitchFamily="49" charset="0"/>
-              </a:rPr>
-              <a:t>TEST_A</a:t>
+              <a:t>*_TEST_A</a:t>
             </a:r>
             <a:endParaRPr lang="en-US" sz="900" dirty="0">
               <a:solidFill>
@@ -14380,6 +14216,156 @@
               <a:latin typeface="Courier New" panose="02070309020205020404" pitchFamily="49" charset="0"/>
               <a:cs typeface="Courier New" panose="02070309020205020404" pitchFamily="49" charset="0"/>
             </a:endParaRPr>
+          </a:p>
+        </p:txBody>
+      </p:sp>
+      <p:sp>
+        <p:nvSpPr>
+          <p:cNvPr id="226" name="Rectangle 225"/>
+          <p:cNvSpPr/>
+          <p:nvPr/>
+        </p:nvSpPr>
+        <p:spPr>
+          <a:xfrm>
+            <a:off x="7162800" y="5105400"/>
+            <a:ext cx="457200" cy="152400"/>
+          </a:xfrm>
+          <a:prstGeom prst="rect">
+            <a:avLst/>
+          </a:prstGeom>
+          <a:noFill/>
+          <a:ln>
+            <a:noFill/>
+          </a:ln>
+        </p:spPr>
+        <p:style>
+          <a:lnRef idx="2">
+            <a:schemeClr val="accent1">
+              <a:shade val="50000"/>
+            </a:schemeClr>
+          </a:lnRef>
+          <a:fillRef idx="1">
+            <a:schemeClr val="accent1"/>
+          </a:fillRef>
+          <a:effectRef idx="0">
+            <a:schemeClr val="accent1"/>
+          </a:effectRef>
+          <a:fontRef idx="minor">
+            <a:schemeClr val="lt1"/>
+          </a:fontRef>
+        </p:style>
+        <p:txBody>
+          <a:bodyPr wrap="none" lIns="45720" rIns="45720" rtlCol="0" anchor="ctr"/>
+          <a:lstStyle/>
+          <a:p>
+            <a:pPr algn="r"/>
+            <a:r>
+              <a:rPr lang="en-US" sz="900" dirty="0" smtClean="0">
+                <a:solidFill>
+                  <a:srgbClr val="000000"/>
+                </a:solidFill>
+                <a:latin typeface="Courier New" panose="02070309020205020404" pitchFamily="49" charset="0"/>
+                <a:cs typeface="Courier New" panose="02070309020205020404" pitchFamily="49" charset="0"/>
+              </a:rPr>
+              <a:t>CNT2</a:t>
+            </a:r>
+            <a:endParaRPr lang="en-US" sz="900" dirty="0">
+              <a:solidFill>
+                <a:srgbClr val="000000"/>
+              </a:solidFill>
+              <a:latin typeface="Courier New" panose="02070309020205020404" pitchFamily="49" charset="0"/>
+              <a:cs typeface="Courier New" panose="02070309020205020404" pitchFamily="49" charset="0"/>
+            </a:endParaRPr>
+          </a:p>
+        </p:txBody>
+      </p:sp>
+      <p:cxnSp>
+        <p:nvCxnSpPr>
+          <p:cNvPr id="231" name="Straight Connector 230"/>
+          <p:cNvCxnSpPr/>
+          <p:nvPr/>
+        </p:nvCxnSpPr>
+        <p:spPr>
+          <a:xfrm flipV="1">
+            <a:off x="7696200" y="5105400"/>
+            <a:ext cx="152400" cy="152400"/>
+          </a:xfrm>
+          <a:prstGeom prst="line">
+            <a:avLst/>
+          </a:prstGeom>
+          <a:ln w="12700">
+            <a:solidFill>
+              <a:srgbClr val="000000"/>
+            </a:solidFill>
+            <a:headEnd type="none" w="med" len="med"/>
+            <a:tailEnd type="none" w="med" len="med"/>
+          </a:ln>
+        </p:spPr>
+        <p:style>
+          <a:lnRef idx="1">
+            <a:schemeClr val="accent1"/>
+          </a:lnRef>
+          <a:fillRef idx="0">
+            <a:schemeClr val="accent1"/>
+          </a:fillRef>
+          <a:effectRef idx="0">
+            <a:schemeClr val="accent1"/>
+          </a:effectRef>
+          <a:fontRef idx="minor">
+            <a:schemeClr val="tx1"/>
+          </a:fontRef>
+        </p:style>
+      </p:cxnSp>
+      <p:sp>
+        <p:nvSpPr>
+          <p:cNvPr id="234" name="Rectangle 233"/>
+          <p:cNvSpPr/>
+          <p:nvPr/>
+        </p:nvSpPr>
+        <p:spPr>
+          <a:xfrm>
+            <a:off x="7696200" y="5029200"/>
+            <a:ext cx="152400" cy="76200"/>
+          </a:xfrm>
+          <a:prstGeom prst="rect">
+            <a:avLst/>
+          </a:prstGeom>
+          <a:noFill/>
+          <a:ln>
+            <a:noFill/>
+          </a:ln>
+        </p:spPr>
+        <p:style>
+          <a:lnRef idx="2">
+            <a:schemeClr val="accent1">
+              <a:shade val="50000"/>
+            </a:schemeClr>
+          </a:lnRef>
+          <a:fillRef idx="1">
+            <a:schemeClr val="accent1"/>
+          </a:fillRef>
+          <a:effectRef idx="0">
+            <a:schemeClr val="accent1"/>
+          </a:effectRef>
+          <a:fontRef idx="minor">
+            <a:schemeClr val="lt1"/>
+          </a:fontRef>
+        </p:style>
+        <p:txBody>
+          <a:bodyPr wrap="none" lIns="45720" rIns="45720" rtlCol="0" anchor="ctr"/>
+          <a:lstStyle/>
+          <a:p>
+            <a:pPr algn="ctr"/>
+            <a:r>
+              <a:rPr lang="en-US" sz="900" dirty="0">
+                <a:solidFill>
+                  <a:srgbClr val="000000"/>
+                </a:solidFill>
+                <a:latin typeface="Courier New" panose="02070309020205020404" pitchFamily="49" charset="0"/>
+                <a:cs typeface="Courier New" panose="02070309020205020404" pitchFamily="49" charset="0"/>
+              </a:rPr>
+              <a:t>8</a:t>
+            </a:r>
           </a:p>
         </p:txBody>
       </p:sp>

</xml_diff>